<commit_message>
2015.09.24 : Meena - section 1,2, reference updates
</commit_message>
<xml_diff>
--- a/MSstatsOverview.pptx
+++ b/MSstatsOverview.pptx
@@ -288,7 +288,7 @@
           <a:p>
             <a:fld id="{0E0572D0-4ED7-FA4E-9CEF-AE0750E7896A}" type="datetimeFigureOut">
               <a:rPr lang="en-US" smtClean="0"/>
-              <a:t>1/3/14</a:t>
+              <a:t>9/24/15</a:t>
             </a:fld>
             <a:endParaRPr lang="en-US"/>
           </a:p>
@@ -458,7 +458,7 @@
           <a:p>
             <a:fld id="{0E0572D0-4ED7-FA4E-9CEF-AE0750E7896A}" type="datetimeFigureOut">
               <a:rPr lang="en-US" smtClean="0"/>
-              <a:t>1/3/14</a:t>
+              <a:t>9/24/15</a:t>
             </a:fld>
             <a:endParaRPr lang="en-US"/>
           </a:p>
@@ -638,7 +638,7 @@
           <a:p>
             <a:fld id="{0E0572D0-4ED7-FA4E-9CEF-AE0750E7896A}" type="datetimeFigureOut">
               <a:rPr lang="en-US" smtClean="0"/>
-              <a:t>1/3/14</a:t>
+              <a:t>9/24/15</a:t>
             </a:fld>
             <a:endParaRPr lang="en-US"/>
           </a:p>
@@ -808,7 +808,7 @@
           <a:p>
             <a:fld id="{0E0572D0-4ED7-FA4E-9CEF-AE0750E7896A}" type="datetimeFigureOut">
               <a:rPr lang="en-US" smtClean="0"/>
-              <a:t>1/3/14</a:t>
+              <a:t>9/24/15</a:t>
             </a:fld>
             <a:endParaRPr lang="en-US"/>
           </a:p>
@@ -1054,7 +1054,7 @@
           <a:p>
             <a:fld id="{0E0572D0-4ED7-FA4E-9CEF-AE0750E7896A}" type="datetimeFigureOut">
               <a:rPr lang="en-US" smtClean="0"/>
-              <a:t>1/3/14</a:t>
+              <a:t>9/24/15</a:t>
             </a:fld>
             <a:endParaRPr lang="en-US"/>
           </a:p>
@@ -1342,7 +1342,7 @@
           <a:p>
             <a:fld id="{0E0572D0-4ED7-FA4E-9CEF-AE0750E7896A}" type="datetimeFigureOut">
               <a:rPr lang="en-US" smtClean="0"/>
-              <a:t>1/3/14</a:t>
+              <a:t>9/24/15</a:t>
             </a:fld>
             <a:endParaRPr lang="en-US"/>
           </a:p>
@@ -1769,7 +1769,7 @@
           <a:p>
             <a:fld id="{0E0572D0-4ED7-FA4E-9CEF-AE0750E7896A}" type="datetimeFigureOut">
               <a:rPr lang="en-US" smtClean="0"/>
-              <a:t>1/3/14</a:t>
+              <a:t>9/24/15</a:t>
             </a:fld>
             <a:endParaRPr lang="en-US"/>
           </a:p>
@@ -1887,7 +1887,7 @@
           <a:p>
             <a:fld id="{0E0572D0-4ED7-FA4E-9CEF-AE0750E7896A}" type="datetimeFigureOut">
               <a:rPr lang="en-US" smtClean="0"/>
-              <a:t>1/3/14</a:t>
+              <a:t>9/24/15</a:t>
             </a:fld>
             <a:endParaRPr lang="en-US"/>
           </a:p>
@@ -1982,7 +1982,7 @@
           <a:p>
             <a:fld id="{0E0572D0-4ED7-FA4E-9CEF-AE0750E7896A}" type="datetimeFigureOut">
               <a:rPr lang="en-US" smtClean="0"/>
-              <a:t>1/3/14</a:t>
+              <a:t>9/24/15</a:t>
             </a:fld>
             <a:endParaRPr lang="en-US"/>
           </a:p>
@@ -2259,7 +2259,7 @@
           <a:p>
             <a:fld id="{0E0572D0-4ED7-FA4E-9CEF-AE0750E7896A}" type="datetimeFigureOut">
               <a:rPr lang="en-US" smtClean="0"/>
-              <a:t>1/3/14</a:t>
+              <a:t>9/24/15</a:t>
             </a:fld>
             <a:endParaRPr lang="en-US"/>
           </a:p>
@@ -2512,7 +2512,7 @@
           <a:p>
             <a:fld id="{0E0572D0-4ED7-FA4E-9CEF-AE0750E7896A}" type="datetimeFigureOut">
               <a:rPr lang="en-US" smtClean="0"/>
-              <a:t>1/3/14</a:t>
+              <a:t>9/24/15</a:t>
             </a:fld>
             <a:endParaRPr lang="en-US"/>
           </a:p>
@@ -2725,7 +2725,7 @@
           <a:p>
             <a:fld id="{0E0572D0-4ED7-FA4E-9CEF-AE0750E7896A}" type="datetimeFigureOut">
               <a:rPr lang="en-US" smtClean="0"/>
-              <a:t>1/3/14</a:t>
+              <a:t>9/24/15</a:t>
             </a:fld>
             <a:endParaRPr lang="en-US"/>
           </a:p>
@@ -3108,7 +3108,7 @@
         </p:nvSpPr>
         <p:spPr>
           <a:xfrm>
-            <a:off x="4138947" y="4694015"/>
+            <a:off x="4138947" y="6369815"/>
             <a:ext cx="8546541" cy="1223412"/>
           </a:xfrm>
           <a:prstGeom prst="rect">
@@ -3140,18 +3140,18 @@
               <a:buChar char="•"/>
             </a:pPr>
             <a:r>
-              <a:rPr lang="en-US" sz="2400" dirty="0" err="1" smtClean="0">
-                <a:latin typeface="Gill Sans"/>
-                <a:cs typeface="Gill Sans"/>
-              </a:rPr>
-              <a:t>Quanlity</a:t>
-            </a:r>
-            <a:r>
               <a:rPr lang="en-US" sz="2400" dirty="0" smtClean="0">
                 <a:latin typeface="Gill Sans"/>
                 <a:cs typeface="Gill Sans"/>
               </a:rPr>
-              <a:t> control plot</a:t>
+              <a:t>Quality </a:t>
+            </a:r>
+            <a:r>
+              <a:rPr lang="en-US" sz="2400" dirty="0" smtClean="0">
+                <a:latin typeface="Gill Sans"/>
+                <a:cs typeface="Gill Sans"/>
+              </a:rPr>
+              <a:t>control plot</a:t>
             </a:r>
           </a:p>
           <a:p>
@@ -3233,7 +3233,7 @@
         </p:nvSpPr>
         <p:spPr>
           <a:xfrm>
-            <a:off x="3703670" y="3996427"/>
+            <a:off x="3703670" y="5689867"/>
             <a:ext cx="2615099" cy="640080"/>
           </a:xfrm>
           <a:prstGeom prst="rect">
@@ -3289,7 +3289,7 @@
         </p:nvSpPr>
         <p:spPr>
           <a:xfrm>
-            <a:off x="3703670" y="6123437"/>
+            <a:off x="3703670" y="9492677"/>
             <a:ext cx="6481376" cy="640080"/>
           </a:xfrm>
           <a:prstGeom prst="rect">
@@ -3569,8 +3569,8 @@
         </p:nvSpPr>
         <p:spPr>
           <a:xfrm>
-            <a:off x="4138946" y="1481259"/>
-            <a:ext cx="10236436" cy="2331407"/>
+            <a:off x="4138945" y="1481259"/>
+            <a:ext cx="10854833" cy="4178067"/>
           </a:xfrm>
           <a:prstGeom prst="rect">
             <a:avLst/>
@@ -3592,14 +3592,7 @@
                 <a:latin typeface="Gill Sans"/>
                 <a:cs typeface="Gill Sans"/>
               </a:rPr>
-              <a:t>Summary </a:t>
-            </a:r>
-            <a:r>
-              <a:rPr lang="en-US" sz="2400" dirty="0" smtClean="0">
-                <a:latin typeface="Gill Sans"/>
-                <a:cs typeface="Gill Sans"/>
-              </a:rPr>
-              <a:t>report: feature, sample, </a:t>
+              <a:t>Summary report: feature, sample, </a:t>
             </a:r>
             <a:r>
               <a:rPr lang="en-US" sz="2400" dirty="0" err="1" smtClean="0">
@@ -3639,14 +3632,7 @@
                 <a:latin typeface="Gill Sans"/>
                 <a:cs typeface="Gill Sans"/>
               </a:rPr>
-              <a:t>Normalization: bias of MS </a:t>
-            </a:r>
-            <a:r>
-              <a:rPr lang="en-US" sz="2400" dirty="0" smtClean="0">
-                <a:latin typeface="Gill Sans"/>
-                <a:cs typeface="Gill Sans"/>
-              </a:rPr>
-              <a:t>run</a:t>
+              <a:t>Normalization: bias of MS run</a:t>
             </a:r>
           </a:p>
           <a:p>
@@ -3692,7 +3678,93 @@
                 <a:latin typeface="Gill Sans"/>
                 <a:cs typeface="Gill Sans"/>
               </a:rPr>
-              <a:t>normalization using global standard proteins</a:t>
+              <a:t>normalization using global standard </a:t>
+            </a:r>
+            <a:r>
+              <a:rPr lang="en-US" sz="2400" dirty="0" smtClean="0">
+                <a:latin typeface="Gill Sans"/>
+                <a:cs typeface="Gill Sans"/>
+              </a:rPr>
+              <a:t>proteins</a:t>
+            </a:r>
+          </a:p>
+          <a:p>
+            <a:pPr marL="428625" indent="-428625">
+              <a:buFont typeface="Arial"/>
+              <a:buChar char="•"/>
+            </a:pPr>
+            <a:r>
+              <a:rPr lang="en-US" sz="2400" dirty="0" smtClean="0">
+                <a:latin typeface="Gill Sans"/>
+                <a:cs typeface="Gill Sans"/>
+              </a:rPr>
+              <a:t>Model-based run quantification</a:t>
+            </a:r>
+          </a:p>
+          <a:p>
+            <a:pPr marL="1139800" lvl="1" indent="-428625">
+              <a:buFont typeface="Arial"/>
+              <a:buChar char="•"/>
+            </a:pPr>
+            <a:r>
+              <a:rPr lang="en-US" sz="2400" dirty="0" err="1" smtClean="0">
+                <a:latin typeface="Gill Sans"/>
+                <a:cs typeface="Gill Sans"/>
+              </a:rPr>
+              <a:t>Tukey’s</a:t>
+            </a:r>
+            <a:r>
+              <a:rPr lang="en-US" sz="2400" dirty="0" smtClean="0">
+                <a:latin typeface="Gill Sans"/>
+                <a:cs typeface="Gill Sans"/>
+              </a:rPr>
+              <a:t> median polish or linear model</a:t>
+            </a:r>
+          </a:p>
+          <a:p>
+            <a:pPr marL="1139800" lvl="1" indent="-428625">
+              <a:buFont typeface="Arial"/>
+              <a:buChar char="•"/>
+            </a:pPr>
+            <a:r>
+              <a:rPr lang="en-US" sz="2400" dirty="0">
+                <a:latin typeface="Gill Sans"/>
+                <a:cs typeface="Gill Sans"/>
+              </a:rPr>
+              <a:t>Label-based or label-free</a:t>
+            </a:r>
+          </a:p>
+          <a:p>
+            <a:pPr marL="1139800" lvl="1" indent="-428625">
+              <a:buFont typeface="Arial"/>
+              <a:buChar char="•"/>
+            </a:pPr>
+            <a:r>
+              <a:rPr lang="en-US" sz="2400" dirty="0" smtClean="0">
+                <a:latin typeface="Gill Sans"/>
+                <a:cs typeface="Gill Sans"/>
+              </a:rPr>
+              <a:t>Censored or random missing values</a:t>
+            </a:r>
+          </a:p>
+          <a:p>
+            <a:pPr marL="1139800" lvl="1" indent="-428625">
+              <a:buFont typeface="Arial"/>
+              <a:buChar char="•"/>
+            </a:pPr>
+            <a:r>
+              <a:rPr lang="en-US" sz="2400" dirty="0">
+                <a:latin typeface="Gill Sans"/>
+                <a:cs typeface="Gill Sans"/>
+              </a:rPr>
+              <a:t>I</a:t>
+            </a:r>
+            <a:r>
+              <a:rPr lang="en-US" sz="2400" dirty="0" smtClean="0">
+                <a:latin typeface="Gill Sans"/>
+                <a:cs typeface="Gill Sans"/>
+              </a:rPr>
+              <a:t>mputation by accelerated failure model or not</a:t>
             </a:r>
             <a:endParaRPr lang="en-US" sz="2400" dirty="0" smtClean="0">
               <a:latin typeface="Gill Sans"/>
@@ -3775,8 +3847,8 @@
         </p:nvSpPr>
         <p:spPr>
           <a:xfrm>
-            <a:off x="4138946" y="6821026"/>
-            <a:ext cx="11163554" cy="2331407"/>
+            <a:off x="4138946" y="10172626"/>
+            <a:ext cx="11163554" cy="854080"/>
           </a:xfrm>
           <a:prstGeom prst="rect">
             <a:avLst/>
@@ -3805,14 +3877,7 @@
                 <a:latin typeface="Gill Sans"/>
                 <a:cs typeface="Gill Sans"/>
               </a:rPr>
-              <a:t>ists </a:t>
-            </a:r>
-            <a:r>
-              <a:rPr lang="en-US" sz="2400" dirty="0" smtClean="0">
-                <a:latin typeface="Gill Sans"/>
-                <a:cs typeface="Gill Sans"/>
-              </a:rPr>
-              <a:t>of adjusted p-values fitted with a variety of models</a:t>
+              <a:t>ists of adjusted p-values fitted with a variety of models</a:t>
             </a:r>
           </a:p>
           <a:p>
@@ -3821,91 +3886,18 @@
               <a:buChar char="•"/>
             </a:pPr>
             <a:r>
-              <a:rPr lang="en-US" sz="2400" dirty="0">
-                <a:latin typeface="Gill Sans"/>
-                <a:cs typeface="Gill Sans"/>
-              </a:rPr>
-              <a:t>L</a:t>
-            </a:r>
-            <a:r>
               <a:rPr lang="en-US" sz="2400" dirty="0" smtClean="0">
                 <a:latin typeface="Gill Sans"/>
                 <a:cs typeface="Gill Sans"/>
               </a:rPr>
-              <a:t>abel</a:t>
+              <a:t>Multiple </a:t>
             </a:r>
             <a:r>
               <a:rPr lang="en-US" sz="2400" dirty="0" smtClean="0">
                 <a:latin typeface="Gill Sans"/>
                 <a:cs typeface="Gill Sans"/>
               </a:rPr>
-              <a:t>-based or label-free</a:t>
-            </a:r>
-          </a:p>
-          <a:p>
-            <a:pPr marL="1139800" lvl="1" indent="-428625">
-              <a:buFont typeface="Arial"/>
-              <a:buChar char="•"/>
-            </a:pPr>
-            <a:r>
-              <a:rPr lang="en-US" sz="2400" dirty="0">
-                <a:latin typeface="Gill Sans"/>
-                <a:cs typeface="Gill Sans"/>
-              </a:rPr>
-              <a:t>E</a:t>
-            </a:r>
-            <a:r>
-              <a:rPr lang="en-US" sz="2400" dirty="0" smtClean="0">
-                <a:latin typeface="Gill Sans"/>
-                <a:cs typeface="Gill Sans"/>
-              </a:rPr>
-              <a:t>xpanded </a:t>
-            </a:r>
-            <a:r>
-              <a:rPr lang="en-US" sz="2400" dirty="0" smtClean="0">
-                <a:latin typeface="Gill Sans"/>
-                <a:cs typeface="Gill Sans"/>
-              </a:rPr>
-              <a:t>or restricted scope of Biological or Technical replication</a:t>
-            </a:r>
-          </a:p>
-          <a:p>
-            <a:pPr marL="1139800" lvl="1" indent="-428625">
-              <a:buFont typeface="Arial"/>
-              <a:buChar char="•"/>
-            </a:pPr>
-            <a:r>
-              <a:rPr lang="en-US" sz="2400" dirty="0" smtClean="0">
-                <a:latin typeface="Gill Sans"/>
-                <a:cs typeface="Gill Sans"/>
-              </a:rPr>
-              <a:t>Account interference transition or not</a:t>
-            </a:r>
-          </a:p>
-          <a:p>
-            <a:pPr marL="1139800" lvl="1" indent="-428625">
-              <a:buFont typeface="Arial"/>
-              <a:buChar char="•"/>
-            </a:pPr>
-            <a:r>
-              <a:rPr lang="en-US" sz="2400" dirty="0" smtClean="0">
-                <a:latin typeface="Gill Sans"/>
-                <a:cs typeface="Gill Sans"/>
-              </a:rPr>
-              <a:t>Account unequal variance among features</a:t>
-            </a:r>
-          </a:p>
-          <a:p>
-            <a:pPr marL="1139800" lvl="1" indent="-428625">
-              <a:buFont typeface="Arial"/>
-              <a:buChar char="•"/>
-            </a:pPr>
-            <a:r>
-              <a:rPr lang="en-US" sz="2400" dirty="0" smtClean="0">
-                <a:latin typeface="Gill Sans"/>
-                <a:cs typeface="Gill Sans"/>
-              </a:rPr>
-              <a:t>Multiple comparisons</a:t>
+              <a:t>comparisons</a:t>
             </a:r>
           </a:p>
         </p:txBody>
@@ -3958,7 +3950,21 @@
                 <a:latin typeface="Gill Sans"/>
                 <a:cs typeface="Gill Sans"/>
               </a:rPr>
-              <a:t>Sample size calculation: # of biological replicates, peptides, transition; according to FDR and CV</a:t>
+              <a:t>Sample size calculation: # of biological </a:t>
+            </a:r>
+            <a:r>
+              <a:rPr lang="en-US" sz="2400" dirty="0" smtClean="0">
+                <a:latin typeface="Gill Sans"/>
+                <a:cs typeface="Gill Sans"/>
+              </a:rPr>
+              <a:t>replicates </a:t>
+            </a:r>
+            <a:r>
+              <a:rPr lang="en-US" sz="2400" dirty="0" smtClean="0">
+                <a:latin typeface="Gill Sans"/>
+                <a:cs typeface="Gill Sans"/>
+              </a:rPr>
+              <a:t>according to FDR and CV</a:t>
             </a:r>
           </a:p>
           <a:p>
@@ -4033,7 +4039,7 @@
         </p:nvSpPr>
         <p:spPr>
           <a:xfrm>
-            <a:off x="6862003" y="808344"/>
+            <a:off x="6862003" y="790704"/>
             <a:ext cx="3050375" cy="640080"/>
           </a:xfrm>
           <a:prstGeom prst="rect">
@@ -4096,7 +4102,7 @@
         </p:nvSpPr>
         <p:spPr>
           <a:xfrm>
-            <a:off x="6420370" y="4019603"/>
+            <a:off x="6420370" y="5713043"/>
             <a:ext cx="3764677" cy="640080"/>
           </a:xfrm>
           <a:prstGeom prst="rect">
@@ -4159,7 +4165,7 @@
         </p:nvSpPr>
         <p:spPr>
           <a:xfrm>
-            <a:off x="10265602" y="6123437"/>
+            <a:off x="10265602" y="9492677"/>
             <a:ext cx="3653598" cy="640080"/>
           </a:xfrm>
           <a:prstGeom prst="rect">
@@ -4474,7 +4480,7 @@
         </p:nvSpPr>
         <p:spPr>
           <a:xfrm>
-            <a:off x="341088" y="2499749"/>
+            <a:off x="341088" y="4069409"/>
             <a:ext cx="2630713" cy="1569660"/>
           </a:xfrm>
           <a:prstGeom prst="rect">
@@ -4553,7 +4559,7 @@
         </p:nvSpPr>
         <p:spPr>
           <a:xfrm>
-            <a:off x="341088" y="8671342"/>
+            <a:off x="341088" y="10314881"/>
             <a:ext cx="2630713" cy="1569660"/>
           </a:xfrm>
           <a:prstGeom prst="rect">
@@ -4688,8 +4694,8 @@
         </p:nvSpPr>
         <p:spPr>
           <a:xfrm>
-            <a:off x="2844801" y="990848"/>
-            <a:ext cx="675117" cy="4653596"/>
+            <a:off x="2844801" y="990847"/>
+            <a:ext cx="675117" cy="8040699"/>
           </a:xfrm>
           <a:prstGeom prst="leftBrace">
             <a:avLst>
@@ -4734,8 +4740,8 @@
         </p:nvSpPr>
         <p:spPr>
           <a:xfrm>
-            <a:off x="2844801" y="6304057"/>
-            <a:ext cx="675117" cy="6537049"/>
+            <a:off x="2844801" y="9825335"/>
+            <a:ext cx="675117" cy="3015771"/>
           </a:xfrm>
           <a:prstGeom prst="leftBrace">
             <a:avLst/>
@@ -4777,8 +4783,8 @@
         </p:nvSpPr>
         <p:spPr>
           <a:xfrm>
-            <a:off x="2844801" y="13405553"/>
-            <a:ext cx="675117" cy="2202773"/>
+            <a:off x="2844801" y="13654931"/>
+            <a:ext cx="675117" cy="1953395"/>
           </a:xfrm>
           <a:prstGeom prst="leftBrace">
             <a:avLst/>
@@ -4919,69 +4925,13 @@
       </p:sp>
       <p:sp>
         <p:nvSpPr>
-          <p:cNvPr id="35" name="Rectangle 34"/>
-          <p:cNvSpPr/>
-          <p:nvPr/>
-        </p:nvSpPr>
-        <p:spPr>
-          <a:xfrm>
-            <a:off x="3714958" y="9341831"/>
-            <a:ext cx="2615100" cy="640080"/>
-          </a:xfrm>
-          <a:prstGeom prst="rect">
-            <a:avLst/>
-          </a:prstGeom>
-          <a:solidFill>
-            <a:schemeClr val="bg1"/>
-          </a:solidFill>
-          <a:ln>
-            <a:solidFill>
-              <a:schemeClr val="tx1"/>
-            </a:solidFill>
-          </a:ln>
-          <a:effectLst/>
-        </p:spPr>
-        <p:style>
-          <a:lnRef idx="1">
-            <a:schemeClr val="accent1"/>
-          </a:lnRef>
-          <a:fillRef idx="3">
-            <a:schemeClr val="accent1"/>
-          </a:fillRef>
-          <a:effectRef idx="2">
-            <a:schemeClr val="accent1"/>
-          </a:effectRef>
-          <a:fontRef idx="minor">
-            <a:schemeClr val="lt1"/>
-          </a:fontRef>
-        </p:style>
-        <p:txBody>
-          <a:bodyPr lIns="114300" tIns="57150" rIns="114300" bIns="57150" spcCol="0" rtlCol="0" anchor="ctr"/>
-          <a:lstStyle/>
-          <a:p>
-            <a:pPr algn="ctr"/>
-            <a:r>
-              <a:rPr lang="en-US" sz="3500" dirty="0">
-                <a:solidFill>
-                  <a:schemeClr val="tx1"/>
-                </a:solidFill>
-                <a:latin typeface="Gill Sans"/>
-                <a:cs typeface="Gill Sans"/>
-              </a:rPr>
-              <a:t>Visualization</a:t>
-            </a:r>
-          </a:p>
-        </p:txBody>
-      </p:sp>
-      <p:sp>
-        <p:nvSpPr>
           <p:cNvPr id="36" name="Rectangle 35"/>
           <p:cNvSpPr/>
           <p:nvPr/>
         </p:nvSpPr>
         <p:spPr>
           <a:xfrm>
-            <a:off x="6431661" y="9350185"/>
+            <a:off x="6420370" y="7708370"/>
             <a:ext cx="4236340" cy="631726"/>
           </a:xfrm>
           <a:prstGeom prst="rect">
@@ -5036,69 +4986,140 @@
           </a:p>
         </p:txBody>
       </p:sp>
-      <p:sp>
-        <p:nvSpPr>
-          <p:cNvPr id="37" name="TextBox 36"/>
-          <p:cNvSpPr txBox="1"/>
+      <p:grpSp>
+        <p:nvGrpSpPr>
+          <p:cNvPr id="2" name="Group 1"/>
+          <p:cNvGrpSpPr/>
           <p:nvPr/>
-        </p:nvSpPr>
-        <p:spPr>
+        </p:nvGrpSpPr>
+        <p:grpSpPr>
           <a:xfrm>
-            <a:off x="4150237" y="10067641"/>
-            <a:ext cx="8546541" cy="854080"/>
+            <a:off x="3703671" y="7700016"/>
+            <a:ext cx="8981820" cy="1526970"/>
+            <a:chOff x="3714958" y="9253631"/>
+            <a:chExt cx="8981820" cy="1526970"/>
           </a:xfrm>
-          <a:prstGeom prst="rect">
-            <a:avLst/>
-          </a:prstGeom>
-          <a:noFill/>
-        </p:spPr>
-        <p:txBody>
-          <a:bodyPr wrap="square" lIns="114300" tIns="57150" rIns="114300" bIns="57150" rtlCol="0">
-            <a:spAutoFit/>
-          </a:bodyPr>
-          <a:lstStyle/>
-          <a:p>
-            <a:pPr marL="428625" indent="-428625">
-              <a:buFont typeface="Arial"/>
-              <a:buChar char="•"/>
-            </a:pPr>
-            <a:r>
-              <a:rPr lang="en-US" sz="2400" dirty="0" smtClean="0">
-                <a:latin typeface="Gill Sans"/>
-                <a:cs typeface="Gill Sans"/>
-              </a:rPr>
-              <a:t>Residual plot</a:t>
-            </a:r>
-          </a:p>
-          <a:p>
-            <a:pPr marL="428625" indent="-428625">
-              <a:buFont typeface="Arial"/>
-              <a:buChar char="•"/>
-            </a:pPr>
-            <a:r>
-              <a:rPr lang="en-US" sz="2400" dirty="0" smtClean="0">
-                <a:latin typeface="Gill Sans"/>
-                <a:cs typeface="Gill Sans"/>
-              </a:rPr>
-              <a:t>Normal </a:t>
-            </a:r>
-            <a:r>
-              <a:rPr lang="en-US" sz="2400" dirty="0" err="1" smtClean="0">
-                <a:latin typeface="Gill Sans"/>
-                <a:cs typeface="Gill Sans"/>
-              </a:rPr>
-              <a:t>quantile-quantile</a:t>
-            </a:r>
-            <a:r>
-              <a:rPr lang="en-US" sz="2400" dirty="0" smtClean="0">
-                <a:latin typeface="Gill Sans"/>
-                <a:cs typeface="Gill Sans"/>
-              </a:rPr>
-              <a:t> plot</a:t>
-            </a:r>
-          </a:p>
-        </p:txBody>
-      </p:sp>
+        </p:grpSpPr>
+        <p:sp>
+          <p:nvSpPr>
+            <p:cNvPr id="35" name="Rectangle 34"/>
+            <p:cNvSpPr/>
+            <p:nvPr/>
+          </p:nvSpPr>
+          <p:spPr>
+            <a:xfrm>
+              <a:off x="3714958" y="9253631"/>
+              <a:ext cx="2615100" cy="640080"/>
+            </a:xfrm>
+            <a:prstGeom prst="rect">
+              <a:avLst/>
+            </a:prstGeom>
+            <a:solidFill>
+              <a:schemeClr val="bg1"/>
+            </a:solidFill>
+            <a:ln>
+              <a:solidFill>
+                <a:schemeClr val="tx1"/>
+              </a:solidFill>
+            </a:ln>
+            <a:effectLst/>
+          </p:spPr>
+          <p:style>
+            <a:lnRef idx="1">
+              <a:schemeClr val="accent1"/>
+            </a:lnRef>
+            <a:fillRef idx="3">
+              <a:schemeClr val="accent1"/>
+            </a:fillRef>
+            <a:effectRef idx="2">
+              <a:schemeClr val="accent1"/>
+            </a:effectRef>
+            <a:fontRef idx="minor">
+              <a:schemeClr val="lt1"/>
+            </a:fontRef>
+          </p:style>
+          <p:txBody>
+            <a:bodyPr lIns="114300" tIns="57150" rIns="114300" bIns="57150" spcCol="0" rtlCol="0" anchor="ctr"/>
+            <a:lstStyle/>
+            <a:p>
+              <a:pPr algn="ctr"/>
+              <a:r>
+                <a:rPr lang="en-US" sz="3500" dirty="0">
+                  <a:solidFill>
+                    <a:schemeClr val="tx1"/>
+                  </a:solidFill>
+                  <a:latin typeface="Gill Sans"/>
+                  <a:cs typeface="Gill Sans"/>
+                </a:rPr>
+                <a:t>Visualization</a:t>
+              </a:r>
+            </a:p>
+          </p:txBody>
+        </p:sp>
+        <p:sp>
+          <p:nvSpPr>
+            <p:cNvPr id="37" name="TextBox 36"/>
+            <p:cNvSpPr txBox="1"/>
+            <p:nvPr/>
+          </p:nvSpPr>
+          <p:spPr>
+            <a:xfrm>
+              <a:off x="4150237" y="9926521"/>
+              <a:ext cx="8546541" cy="854080"/>
+            </a:xfrm>
+            <a:prstGeom prst="rect">
+              <a:avLst/>
+            </a:prstGeom>
+            <a:noFill/>
+          </p:spPr>
+          <p:txBody>
+            <a:bodyPr wrap="square" lIns="114300" tIns="57150" rIns="114300" bIns="57150" rtlCol="0">
+              <a:spAutoFit/>
+            </a:bodyPr>
+            <a:lstStyle/>
+            <a:p>
+              <a:pPr marL="428625" indent="-428625">
+                <a:buFont typeface="Arial"/>
+                <a:buChar char="•"/>
+              </a:pPr>
+              <a:r>
+                <a:rPr lang="en-US" sz="2400" dirty="0" smtClean="0">
+                  <a:latin typeface="Gill Sans"/>
+                  <a:cs typeface="Gill Sans"/>
+                </a:rPr>
+                <a:t>Residual plot</a:t>
+              </a:r>
+            </a:p>
+            <a:p>
+              <a:pPr marL="428625" indent="-428625">
+                <a:buFont typeface="Arial"/>
+                <a:buChar char="•"/>
+              </a:pPr>
+              <a:r>
+                <a:rPr lang="en-US" sz="2400" dirty="0" smtClean="0">
+                  <a:latin typeface="Gill Sans"/>
+                  <a:cs typeface="Gill Sans"/>
+                </a:rPr>
+                <a:t>Normal </a:t>
+              </a:r>
+              <a:r>
+                <a:rPr lang="en-US" sz="2400" dirty="0" err="1" smtClean="0">
+                  <a:latin typeface="Gill Sans"/>
+                  <a:cs typeface="Gill Sans"/>
+                </a:rPr>
+                <a:t>quantile-quantile</a:t>
+              </a:r>
+              <a:r>
+                <a:rPr lang="en-US" sz="2400" dirty="0" smtClean="0">
+                  <a:latin typeface="Gill Sans"/>
+                  <a:cs typeface="Gill Sans"/>
+                </a:rPr>
+                <a:t> plot</a:t>
+              </a:r>
+            </a:p>
+          </p:txBody>
+        </p:sp>
+      </p:grpSp>
     </p:spTree>
     <p:extLst>
       <p:ext uri="{BB962C8B-B14F-4D97-AF65-F5344CB8AC3E}">

</xml_diff>